<commit_message>
updated PPT with new class diagram, added signal processing slide
</commit_message>
<xml_diff>
--- a/ShakyTable.pptx
+++ b/ShakyTable.pptx
@@ -5,17 +5,18 @@
     <p:sldMasterId id="2147483669" r:id="rId4"/>
   </p:sldMasterIdLst>
   <p:notesMasterIdLst>
-    <p:notesMasterId r:id="rId10"/>
+    <p:notesMasterId r:id="rId11"/>
   </p:notesMasterIdLst>
   <p:handoutMasterIdLst>
-    <p:handoutMasterId r:id="rId11"/>
+    <p:handoutMasterId r:id="rId12"/>
   </p:handoutMasterIdLst>
   <p:sldIdLst>
     <p:sldId id="295" r:id="rId5"/>
     <p:sldId id="316" r:id="rId6"/>
     <p:sldId id="313" r:id="rId7"/>
-    <p:sldId id="326" r:id="rId8"/>
-    <p:sldId id="303" r:id="rId9"/>
+    <p:sldId id="327" r:id="rId8"/>
+    <p:sldId id="326" r:id="rId9"/>
+    <p:sldId id="303" r:id="rId10"/>
   </p:sldIdLst>
   <p:sldSz cx="9144000" cy="6858000" type="screen4x3"/>
   <p:notesSz cx="7099300" cy="10234613"/>
@@ -146,7 +147,7 @@
   </p:defaultTextStyle>
   <p:extLst>
     <p:ext uri="{EFAFB233-063F-42B5-8137-9DF3F51BA10A}">
-      <p15:sldGuideLst xmlns:p15="http://schemas.microsoft.com/office/powerpoint/2012/main">
+      <p15:sldGuideLst xmlns:p15="http://schemas.microsoft.com/office/powerpoint/2012/main" xmlns="">
         <p15:guide id="1" orient="horz" pos="596">
           <p15:clr>
             <a:srgbClr val="A4A3A4"/>
@@ -160,7 +161,7 @@
       </p15:sldGuideLst>
     </p:ext>
     <p:ext uri="{2D200454-40CA-4A62-9FC3-DE9A4176ACB9}">
-      <p15:notesGuideLst xmlns:p15="http://schemas.microsoft.com/office/powerpoint/2012/main">
+      <p15:notesGuideLst xmlns:p15="http://schemas.microsoft.com/office/powerpoint/2012/main" xmlns="">
         <p15:guide id="1" orient="horz" pos="3224">
           <p15:clr>
             <a:srgbClr val="A4A3A4"/>
@@ -260,7 +261,7 @@
             <a:fld id="{EFA0D184-D464-48E9-9CA0-A94E873F6C2C}" type="datetimeFigureOut">
               <a:rPr lang="de-CH" smtClean="0"/>
               <a:pPr/>
-              <a:t>06.04.2014</a:t>
+              <a:t>07.04.2014</a:t>
             </a:fld>
             <a:endParaRPr lang="de-CH" dirty="0"/>
           </a:p>
@@ -336,7 +337,7 @@
     </p:spTree>
     <p:extLst>
       <p:ext uri="{BB962C8B-B14F-4D97-AF65-F5344CB8AC3E}">
-        <p14:creationId xmlns:p14="http://schemas.microsoft.com/office/powerpoint/2010/main" val="1961596217"/>
+        <p14:creationId xmlns:p14="http://schemas.microsoft.com/office/powerpoint/2010/main" xmlns="" val="1961596217"/>
       </p:ext>
     </p:extLst>
   </p:cSld>
@@ -428,7 +429,7 @@
             <a:fld id="{5AF2B663-2BA9-4D7E-8201-5DE4109E1EDD}" type="datetimeFigureOut">
               <a:rPr lang="de-CH" smtClean="0"/>
               <a:pPr/>
-              <a:t>06.04.2014</a:t>
+              <a:t>07.04.2014</a:t>
             </a:fld>
             <a:endParaRPr lang="de-CH" dirty="0"/>
           </a:p>
@@ -597,7 +598,7 @@
     </p:spTree>
     <p:extLst>
       <p:ext uri="{BB962C8B-B14F-4D97-AF65-F5344CB8AC3E}">
-        <p14:creationId xmlns:p14="http://schemas.microsoft.com/office/powerpoint/2010/main" val="418899431"/>
+        <p14:creationId xmlns:p14="http://schemas.microsoft.com/office/powerpoint/2010/main" xmlns="" val="418899431"/>
       </p:ext>
     </p:extLst>
   </p:cSld>
@@ -749,7 +750,7 @@
     </p:spTree>
     <p:extLst>
       <p:ext uri="{BB962C8B-B14F-4D97-AF65-F5344CB8AC3E}">
-        <p14:creationId xmlns:p14="http://schemas.microsoft.com/office/powerpoint/2010/main" val="3356331026"/>
+        <p14:creationId xmlns:p14="http://schemas.microsoft.com/office/powerpoint/2010/main" xmlns="" val="3356331026"/>
       </p:ext>
     </p:extLst>
   </p:cSld>
@@ -810,7 +811,7 @@
     </p:spTree>
     <p:extLst>
       <p:ext uri="{BB962C8B-B14F-4D97-AF65-F5344CB8AC3E}">
-        <p14:creationId xmlns:p14="http://schemas.microsoft.com/office/powerpoint/2010/main" val="820882701"/>
+        <p14:creationId xmlns:p14="http://schemas.microsoft.com/office/powerpoint/2010/main" xmlns="" val="820882701"/>
       </p:ext>
     </p:extLst>
   </p:cSld>
@@ -877,7 +878,7 @@
     </p:spTree>
     <p:extLst>
       <p:ext uri="{BB962C8B-B14F-4D97-AF65-F5344CB8AC3E}">
-        <p14:creationId xmlns:p14="http://schemas.microsoft.com/office/powerpoint/2010/main" val="1492901593"/>
+        <p14:creationId xmlns:p14="http://schemas.microsoft.com/office/powerpoint/2010/main" xmlns="" val="1492901593"/>
       </p:ext>
     </p:extLst>
   </p:cSld>
@@ -940,7 +941,7 @@
     </p:spTree>
     <p:extLst>
       <p:ext uri="{BB962C8B-B14F-4D97-AF65-F5344CB8AC3E}">
-        <p14:creationId xmlns:p14="http://schemas.microsoft.com/office/powerpoint/2010/main" val="4169596130"/>
+        <p14:creationId xmlns:p14="http://schemas.microsoft.com/office/powerpoint/2010/main" xmlns="" val="4169596130"/>
       </p:ext>
     </p:extLst>
   </p:cSld>
@@ -1018,7 +1019,7 @@
     </p:spTree>
     <p:extLst>
       <p:ext uri="{BB962C8B-B14F-4D97-AF65-F5344CB8AC3E}">
-        <p14:creationId xmlns:p14="http://schemas.microsoft.com/office/powerpoint/2010/main" val="192290275"/>
+        <p14:creationId xmlns:p14="http://schemas.microsoft.com/office/powerpoint/2010/main" xmlns="" val="192290275"/>
       </p:ext>
     </p:extLst>
   </p:cSld>
@@ -1230,7 +1231,7 @@
           <a:blip r:embed="rId2" cstate="email">
             <a:extLst>
               <a:ext uri="{28A0092B-C50C-407E-A947-70E740481C1C}">
-                <a14:useLocalDpi xmlns:a14="http://schemas.microsoft.com/office/drawing/2010/main"/>
+                <a14:useLocalDpi xmlns:a14="http://schemas.microsoft.com/office/drawing/2010/main" xmlns=""/>
               </a:ext>
             </a:extLst>
           </a:blip>
@@ -1253,14 +1254,14 @@
           </a:ln>
           <a:extLst>
             <a:ext uri="{909E8E84-426E-40DD-AFC4-6F175D3DCCD1}">
-              <a14:hiddenFill xmlns:a14="http://schemas.microsoft.com/office/drawing/2010/main">
+              <a14:hiddenFill xmlns:a14="http://schemas.microsoft.com/office/drawing/2010/main" xmlns="">
                 <a:solidFill>
                   <a:srgbClr val="FFFFFF"/>
                 </a:solidFill>
               </a14:hiddenFill>
             </a:ext>
             <a:ext uri="{91240B29-F687-4F45-9708-019B960494DF}">
-              <a14:hiddenLine xmlns:a14="http://schemas.microsoft.com/office/drawing/2010/main" w="9525">
+              <a14:hiddenLine xmlns:a14="http://schemas.microsoft.com/office/drawing/2010/main" xmlns="" w="9525">
                 <a:solidFill>
                   <a:srgbClr val="000000"/>
                 </a:solidFill>
@@ -1660,7 +1661,7 @@
     </p:spTree>
     <p:extLst>
       <p:ext uri="{BB962C8B-B14F-4D97-AF65-F5344CB8AC3E}">
-        <p14:creationId xmlns:p14="http://schemas.microsoft.com/office/powerpoint/2010/main" val="1910704015"/>
+        <p14:creationId xmlns:p14="http://schemas.microsoft.com/office/powerpoint/2010/main" xmlns="" val="1910704015"/>
       </p:ext>
     </p:extLst>
   </p:cSld>
@@ -2383,7 +2384,7 @@
     </p:spTree>
     <p:extLst>
       <p:ext uri="{BB962C8B-B14F-4D97-AF65-F5344CB8AC3E}">
-        <p14:creationId xmlns:p14="http://schemas.microsoft.com/office/powerpoint/2010/main" val="3458445985"/>
+        <p14:creationId xmlns:p14="http://schemas.microsoft.com/office/powerpoint/2010/main" xmlns="" val="3458445985"/>
       </p:ext>
     </p:extLst>
   </p:cSld>
@@ -2437,7 +2438,7 @@
     </p:spTree>
     <p:extLst>
       <p:ext uri="{BB962C8B-B14F-4D97-AF65-F5344CB8AC3E}">
-        <p14:creationId xmlns:p14="http://schemas.microsoft.com/office/powerpoint/2010/main" val="1513825622"/>
+        <p14:creationId xmlns:p14="http://schemas.microsoft.com/office/powerpoint/2010/main" xmlns="" val="1513825622"/>
       </p:ext>
     </p:extLst>
   </p:cSld>
@@ -2666,7 +2667,7 @@
     </p:spTree>
     <p:extLst>
       <p:ext uri="{BB962C8B-B14F-4D97-AF65-F5344CB8AC3E}">
-        <p14:creationId xmlns:p14="http://schemas.microsoft.com/office/powerpoint/2010/main" val="1475711155"/>
+        <p14:creationId xmlns:p14="http://schemas.microsoft.com/office/powerpoint/2010/main" xmlns="" val="1475711155"/>
       </p:ext>
     </p:extLst>
   </p:cSld>
@@ -2736,7 +2737,7 @@
     </p:spTree>
     <p:extLst>
       <p:ext uri="{BB962C8B-B14F-4D97-AF65-F5344CB8AC3E}">
-        <p14:creationId xmlns:p14="http://schemas.microsoft.com/office/powerpoint/2010/main" val="1232761485"/>
+        <p14:creationId xmlns:p14="http://schemas.microsoft.com/office/powerpoint/2010/main" xmlns="" val="1232761485"/>
       </p:ext>
     </p:extLst>
   </p:cSld>
@@ -2892,7 +2893,7 @@
     </p:spTree>
     <p:extLst>
       <p:ext uri="{BB962C8B-B14F-4D97-AF65-F5344CB8AC3E}">
-        <p14:creationId xmlns:p14="http://schemas.microsoft.com/office/powerpoint/2010/main" val="4122767320"/>
+        <p14:creationId xmlns:p14="http://schemas.microsoft.com/office/powerpoint/2010/main" xmlns="" val="4122767320"/>
       </p:ext>
     </p:extLst>
   </p:cSld>
@@ -3086,7 +3087,7 @@
     </p:spTree>
     <p:extLst>
       <p:ext uri="{BB962C8B-B14F-4D97-AF65-F5344CB8AC3E}">
-        <p14:creationId xmlns:p14="http://schemas.microsoft.com/office/powerpoint/2010/main" val="2823321920"/>
+        <p14:creationId xmlns:p14="http://schemas.microsoft.com/office/powerpoint/2010/main" xmlns="" val="2823321920"/>
       </p:ext>
     </p:extLst>
   </p:cSld>
@@ -3298,7 +3299,7 @@
           <a:blip r:embed="rId2" cstate="email">
             <a:extLst>
               <a:ext uri="{28A0092B-C50C-407E-A947-70E740481C1C}">
-                <a14:useLocalDpi xmlns:a14="http://schemas.microsoft.com/office/drawing/2010/main"/>
+                <a14:useLocalDpi xmlns:a14="http://schemas.microsoft.com/office/drawing/2010/main" xmlns=""/>
               </a:ext>
             </a:extLst>
           </a:blip>
@@ -3321,14 +3322,14 @@
           </a:ln>
           <a:extLst>
             <a:ext uri="{909E8E84-426E-40DD-AFC4-6F175D3DCCD1}">
-              <a14:hiddenFill xmlns:a14="http://schemas.microsoft.com/office/drawing/2010/main">
+              <a14:hiddenFill xmlns:a14="http://schemas.microsoft.com/office/drawing/2010/main" xmlns="">
                 <a:solidFill>
                   <a:srgbClr val="FFFFFF"/>
                 </a:solidFill>
               </a14:hiddenFill>
             </a:ext>
             <a:ext uri="{91240B29-F687-4F45-9708-019B960494DF}">
-              <a14:hiddenLine xmlns:a14="http://schemas.microsoft.com/office/drawing/2010/main" w="9525">
+              <a14:hiddenLine xmlns:a14="http://schemas.microsoft.com/office/drawing/2010/main" xmlns="" w="9525">
                 <a:solidFill>
                   <a:srgbClr val="000000"/>
                 </a:solidFill>
@@ -3549,7 +3550,7 @@
     </p:spTree>
     <p:extLst>
       <p:ext uri="{BB962C8B-B14F-4D97-AF65-F5344CB8AC3E}">
-        <p14:creationId xmlns:p14="http://schemas.microsoft.com/office/powerpoint/2010/main" val="1402682125"/>
+        <p14:creationId xmlns:p14="http://schemas.microsoft.com/office/powerpoint/2010/main" xmlns="" val="1402682125"/>
       </p:ext>
     </p:extLst>
   </p:cSld>
@@ -3946,7 +3947,7 @@
     </p:spTree>
     <p:extLst>
       <p:ext uri="{BB962C8B-B14F-4D97-AF65-F5344CB8AC3E}">
-        <p14:creationId xmlns:p14="http://schemas.microsoft.com/office/powerpoint/2010/main" val="2446949701"/>
+        <p14:creationId xmlns:p14="http://schemas.microsoft.com/office/powerpoint/2010/main" xmlns="" val="2446949701"/>
       </p:ext>
     </p:extLst>
   </p:cSld>
@@ -4352,7 +4353,7 @@
           <a:blip r:embed="rId2" cstate="email">
             <a:extLst>
               <a:ext uri="{28A0092B-C50C-407E-A947-70E740481C1C}">
-                <a14:useLocalDpi xmlns:a14="http://schemas.microsoft.com/office/drawing/2010/main"/>
+                <a14:useLocalDpi xmlns:a14="http://schemas.microsoft.com/office/drawing/2010/main" xmlns=""/>
               </a:ext>
             </a:extLst>
           </a:blip>
@@ -4375,14 +4376,14 @@
           </a:ln>
           <a:extLst>
             <a:ext uri="{909E8E84-426E-40DD-AFC4-6F175D3DCCD1}">
-              <a14:hiddenFill xmlns:a14="http://schemas.microsoft.com/office/drawing/2010/main">
+              <a14:hiddenFill xmlns:a14="http://schemas.microsoft.com/office/drawing/2010/main" xmlns="">
                 <a:solidFill>
                   <a:srgbClr val="FFFFFF"/>
                 </a:solidFill>
               </a14:hiddenFill>
             </a:ext>
             <a:ext uri="{91240B29-F687-4F45-9708-019B960494DF}">
-              <a14:hiddenLine xmlns:a14="http://schemas.microsoft.com/office/drawing/2010/main" w="9525">
+              <a14:hiddenLine xmlns:a14="http://schemas.microsoft.com/office/drawing/2010/main" xmlns="" w="9525">
                 <a:solidFill>
                   <a:srgbClr val="000000"/>
                 </a:solidFill>
@@ -4397,7 +4398,7 @@
     </p:spTree>
     <p:extLst>
       <p:ext uri="{BB962C8B-B14F-4D97-AF65-F5344CB8AC3E}">
-        <p14:creationId xmlns:p14="http://schemas.microsoft.com/office/powerpoint/2010/main" val="1790426494"/>
+        <p14:creationId xmlns:p14="http://schemas.microsoft.com/office/powerpoint/2010/main" xmlns="" val="1790426494"/>
       </p:ext>
     </p:extLst>
   </p:cSld>
@@ -4632,7 +4633,7 @@
     </p:spTree>
     <p:extLst>
       <p:ext uri="{BB962C8B-B14F-4D97-AF65-F5344CB8AC3E}">
-        <p14:creationId xmlns:p14="http://schemas.microsoft.com/office/powerpoint/2010/main" val="3841989189"/>
+        <p14:creationId xmlns:p14="http://schemas.microsoft.com/office/powerpoint/2010/main" xmlns="" val="3841989189"/>
       </p:ext>
     </p:extLst>
   </p:cSld>
@@ -4934,7 +4935,7 @@
     </p:spTree>
     <p:extLst>
       <p:ext uri="{BB962C8B-B14F-4D97-AF65-F5344CB8AC3E}">
-        <p14:creationId xmlns:p14="http://schemas.microsoft.com/office/powerpoint/2010/main" val="1455518026"/>
+        <p14:creationId xmlns:p14="http://schemas.microsoft.com/office/powerpoint/2010/main" xmlns="" val="1455518026"/>
       </p:ext>
     </p:extLst>
   </p:cSld>
@@ -5458,7 +5459,7 @@
     </p:spTree>
     <p:extLst>
       <p:ext uri="{BB962C8B-B14F-4D97-AF65-F5344CB8AC3E}">
-        <p14:creationId xmlns:p14="http://schemas.microsoft.com/office/powerpoint/2010/main" val="1026862296"/>
+        <p14:creationId xmlns:p14="http://schemas.microsoft.com/office/powerpoint/2010/main" xmlns="" val="1026862296"/>
       </p:ext>
     </p:extLst>
   </p:cSld>
@@ -5982,7 +5983,7 @@
     </p:spTree>
     <p:extLst>
       <p:ext uri="{BB962C8B-B14F-4D97-AF65-F5344CB8AC3E}">
-        <p14:creationId xmlns:p14="http://schemas.microsoft.com/office/powerpoint/2010/main" val="3807689984"/>
+        <p14:creationId xmlns:p14="http://schemas.microsoft.com/office/powerpoint/2010/main" xmlns="" val="3807689984"/>
       </p:ext>
     </p:extLst>
   </p:cSld>
@@ -6709,7 +6710,7 @@
     </p:spTree>
     <p:extLst>
       <p:ext uri="{BB962C8B-B14F-4D97-AF65-F5344CB8AC3E}">
-        <p14:creationId xmlns:p14="http://schemas.microsoft.com/office/powerpoint/2010/main" val="225970484"/>
+        <p14:creationId xmlns:p14="http://schemas.microsoft.com/office/powerpoint/2010/main" xmlns="" val="225970484"/>
       </p:ext>
     </p:extLst>
   </p:cSld>
@@ -6763,14 +6764,14 @@
           </a:ln>
           <a:extLst>
             <a:ext uri="{909E8E84-426E-40DD-AFC4-6F175D3DCCD1}">
-              <a14:hiddenFill xmlns:a14="http://schemas.microsoft.com/office/drawing/2010/main">
+              <a14:hiddenFill xmlns:a14="http://schemas.microsoft.com/office/drawing/2010/main" xmlns="">
                 <a:solidFill>
                   <a:srgbClr val="FFFFFF"/>
                 </a:solidFill>
               </a14:hiddenFill>
             </a:ext>
             <a:ext uri="{91240B29-F687-4F45-9708-019B960494DF}">
-              <a14:hiddenLine xmlns:a14="http://schemas.microsoft.com/office/drawing/2010/main" w="9525">
+              <a14:hiddenLine xmlns:a14="http://schemas.microsoft.com/office/drawing/2010/main" xmlns="" w="9525">
                 <a:solidFill>
                   <a:srgbClr val="000000"/>
                 </a:solidFill>
@@ -7554,7 +7555,7 @@
     </p:spTree>
     <p:extLst>
       <p:ext uri="{BB962C8B-B14F-4D97-AF65-F5344CB8AC3E}">
-        <p14:creationId xmlns:p14="http://schemas.microsoft.com/office/powerpoint/2010/main" val="2754208941"/>
+        <p14:creationId xmlns:p14="http://schemas.microsoft.com/office/powerpoint/2010/main" xmlns="" val="2754208941"/>
       </p:ext>
     </p:extLst>
   </p:cSld>
@@ -7678,7 +7679,7 @@
           <a:blip r:embed="rId3">
             <a:extLst>
               <a:ext uri="{28A0092B-C50C-407E-A947-70E740481C1C}">
-                <a14:useLocalDpi xmlns:a14="http://schemas.microsoft.com/office/drawing/2010/main" val="0"/>
+                <a14:useLocalDpi xmlns:a14="http://schemas.microsoft.com/office/drawing/2010/main" xmlns="" val="0"/>
               </a:ext>
             </a:extLst>
           </a:blip>
@@ -7698,7 +7699,7 @@
           <a:noFill/>
           <a:extLst>
             <a:ext uri="{909E8E84-426E-40DD-AFC4-6F175D3DCCD1}">
-              <a14:hiddenFill xmlns:a14="http://schemas.microsoft.com/office/drawing/2010/main">
+              <a14:hiddenFill xmlns:a14="http://schemas.microsoft.com/office/drawing/2010/main" xmlns="">
                 <a:solidFill>
                   <a:srgbClr val="FFFFFF"/>
                 </a:solidFill>
@@ -7719,7 +7720,7 @@
           <a:blip r:embed="rId4">
             <a:extLst>
               <a:ext uri="{28A0092B-C50C-407E-A947-70E740481C1C}">
-                <a14:useLocalDpi xmlns:a14="http://schemas.microsoft.com/office/drawing/2010/main" val="0"/>
+                <a14:useLocalDpi xmlns:a14="http://schemas.microsoft.com/office/drawing/2010/main" xmlns="" val="0"/>
               </a:ext>
             </a:extLst>
           </a:blip>
@@ -7739,7 +7740,7 @@
           <a:noFill/>
           <a:extLst>
             <a:ext uri="{909E8E84-426E-40DD-AFC4-6F175D3DCCD1}">
-              <a14:hiddenFill xmlns:a14="http://schemas.microsoft.com/office/drawing/2010/main">
+              <a14:hiddenFill xmlns:a14="http://schemas.microsoft.com/office/drawing/2010/main" xmlns="">
                 <a:solidFill>
                   <a:srgbClr val="FFFFFF"/>
                 </a:solidFill>
@@ -7751,7 +7752,7 @@
     </p:spTree>
     <p:extLst>
       <p:ext uri="{BB962C8B-B14F-4D97-AF65-F5344CB8AC3E}">
-        <p14:creationId xmlns:p14="http://schemas.microsoft.com/office/powerpoint/2010/main" val="866527643"/>
+        <p14:creationId xmlns:p14="http://schemas.microsoft.com/office/powerpoint/2010/main" xmlns="" val="866527643"/>
       </p:ext>
     </p:extLst>
   </p:cSld>
@@ -7785,6 +7786,32 @@
           <a:chExt cx="0" cy="0"/>
         </a:xfrm>
       </p:grpSpPr>
+      <p:pic>
+        <p:nvPicPr>
+          <p:cNvPr id="1027" name="Picture 3" descr="C:\temp\ShakyTable\Class Diagram.png"/>
+          <p:cNvPicPr>
+            <a:picLocks noChangeAspect="1" noChangeArrowheads="1"/>
+          </p:cNvPicPr>
+          <p:nvPr/>
+        </p:nvPicPr>
+        <p:blipFill>
+          <a:blip r:embed="rId4"/>
+          <a:srcRect/>
+          <a:stretch>
+            <a:fillRect/>
+          </a:stretch>
+        </p:blipFill>
+        <p:spPr bwMode="auto">
+          <a:xfrm>
+            <a:off x="3532215" y="830550"/>
+            <a:ext cx="5547506" cy="5958000"/>
+          </a:xfrm>
+          <a:prstGeom prst="rect">
+            <a:avLst/>
+          </a:prstGeom>
+          <a:noFill/>
+        </p:spPr>
+      </p:pic>
       <p:sp>
         <p:nvSpPr>
           <p:cNvPr id="2" name="Inhaltsplatzhalter 1"/>
@@ -7802,23 +7829,166 @@
           <a:p>
             <a:r>
               <a:rPr lang="de-CH" dirty="0" smtClean="0"/>
-              <a:t>Darstellung mit Ball</a:t>
-            </a:r>
-            <a:endParaRPr lang="de-CH" dirty="0"/>
+              <a:t>Hauptklasse </a:t>
+            </a:r>
+            <a:r>
+              <a:rPr lang="de-CH" b="1" dirty="0" err="1" smtClean="0"/>
+              <a:t>TableView</a:t>
+            </a:r>
+            <a:r>
+              <a:rPr lang="de-CH" b="1" dirty="0" smtClean="0"/>
+              <a:t/>
+            </a:r>
+            <a:br>
+              <a:rPr lang="de-CH" b="1" dirty="0" smtClean="0"/>
+            </a:br>
+            <a:endParaRPr lang="de-CH" b="1" dirty="0" smtClean="0"/>
           </a:p>
           <a:p>
             <a:r>
               <a:rPr lang="de-CH" dirty="0" smtClean="0"/>
-              <a:t>Einstellung der Trägheit</a:t>
-            </a:r>
-            <a:endParaRPr lang="de-CH" dirty="0"/>
-          </a:p>
-          <a:p>
-            <a:r>
+              <a:t>Darstellung und Daten-</a:t>
+            </a:r>
+            <a:br>
               <a:rPr lang="de-CH" dirty="0" smtClean="0"/>
-              <a:t>Design </a:t>
-            </a:r>
-            <a:endParaRPr lang="de-CH" dirty="0"/>
+            </a:br>
+            <a:r>
+              <a:rPr lang="de-CH" dirty="0" err="1" smtClean="0"/>
+              <a:t>verarbeitung</a:t>
+            </a:r>
+            <a:r>
+              <a:rPr lang="de-CH" dirty="0" smtClean="0"/>
+              <a:t> in Klasse </a:t>
+            </a:r>
+            <a:r>
+              <a:rPr lang="de-CH" b="1" dirty="0" smtClean="0"/>
+              <a:t>Ball</a:t>
+            </a:r>
+            <a:br>
+              <a:rPr lang="de-CH" b="1" dirty="0" smtClean="0"/>
+            </a:br>
+            <a:endParaRPr lang="de-CH" b="1" dirty="0"/>
+          </a:p>
+          <a:p>
+            <a:r>
+              <a:rPr lang="de-CH" dirty="0" smtClean="0"/>
+              <a:t>Taster/LED-Anbindung über</a:t>
+            </a:r>
+            <a:br>
+              <a:rPr lang="de-CH" dirty="0" smtClean="0"/>
+            </a:br>
+            <a:r>
+              <a:rPr lang="de-CH" dirty="0" smtClean="0"/>
+              <a:t>Klasse </a:t>
+            </a:r>
+            <a:r>
+              <a:rPr lang="de-CH" b="1" dirty="0" err="1" smtClean="0"/>
+              <a:t>SysfsFileGPIO</a:t>
+            </a:r>
+            <a:r>
+              <a:rPr lang="de-CH" b="1" dirty="0" smtClean="0"/>
+              <a:t/>
+            </a:r>
+            <a:br>
+              <a:rPr lang="de-CH" b="1" dirty="0" smtClean="0"/>
+            </a:br>
+            <a:endParaRPr lang="de-CH" b="1" dirty="0"/>
+          </a:p>
+          <a:p>
+            <a:r>
+              <a:rPr lang="de-CH" dirty="0" smtClean="0"/>
+              <a:t>Sensor-Anbindung über</a:t>
+            </a:r>
+            <a:br>
+              <a:rPr lang="de-CH" dirty="0" smtClean="0"/>
+            </a:br>
+            <a:r>
+              <a:rPr lang="de-CH" dirty="0" smtClean="0"/>
+              <a:t>Klasse </a:t>
+            </a:r>
+            <a:r>
+              <a:rPr lang="de-CH" b="1" dirty="0" smtClean="0"/>
+              <a:t>I2CMotionSensor</a:t>
+            </a:r>
+            <a:r>
+              <a:rPr lang="de-CH" dirty="0" smtClean="0"/>
+              <a:t> und</a:t>
+            </a:r>
+            <a:br>
+              <a:rPr lang="de-CH" dirty="0" smtClean="0"/>
+            </a:br>
+            <a:r>
+              <a:rPr lang="de-CH" b="1" dirty="0" smtClean="0"/>
+              <a:t>I2C</a:t>
+            </a:r>
+            <a:r>
+              <a:rPr lang="de-CH" dirty="0" smtClean="0"/>
+              <a:t> </a:t>
+            </a:r>
+            <a:r>
+              <a:rPr lang="de-CH" sz="1600" i="1" dirty="0" smtClean="0">
+                <a:sym typeface="Wingdings" pitchFamily="2" charset="2"/>
+              </a:rPr>
+              <a:t>(</a:t>
+            </a:r>
+            <a:r>
+              <a:rPr lang="de-CH" sz="1600" i="1" dirty="0" smtClean="0">
+                <a:sym typeface="Wingdings" pitchFamily="2" charset="2"/>
+              </a:rPr>
+              <a:t>Anbindung von C-Code)</a:t>
+            </a:r>
+            <a:br>
+              <a:rPr lang="de-CH" sz="1600" i="1" dirty="0" smtClean="0">
+                <a:sym typeface="Wingdings" pitchFamily="2" charset="2"/>
+              </a:rPr>
+            </a:br>
+            <a:endParaRPr lang="de-CH" sz="1600" i="1" dirty="0" smtClean="0">
+              <a:sym typeface="Wingdings" pitchFamily="2" charset="2"/>
+            </a:endParaRPr>
+          </a:p>
+          <a:p>
+            <a:r>
+              <a:rPr lang="de-CH" dirty="0" smtClean="0"/>
+              <a:t>Regelmässiges Auslesen mit</a:t>
+            </a:r>
+            <a:r>
+              <a:rPr lang="de-CH" dirty="0"/>
+              <a:t/>
+            </a:r>
+            <a:br>
+              <a:rPr lang="de-CH" dirty="0"/>
+            </a:br>
+            <a:r>
+              <a:rPr lang="de-CH" b="1" dirty="0" err="1" smtClean="0"/>
+              <a:t>ScheduledExecutorService</a:t>
+            </a:r>
+            <a:r>
+              <a:rPr lang="de-CH" dirty="0" smtClean="0"/>
+              <a:t/>
+            </a:r>
+            <a:br>
+              <a:rPr lang="de-CH" dirty="0" smtClean="0"/>
+            </a:br>
+            <a:r>
+              <a:rPr lang="de-CH" dirty="0" smtClean="0"/>
+              <a:t>(ist die bevorzugte Klasse vor </a:t>
+            </a:r>
+            <a:r>
+              <a:rPr lang="de-CH" b="1" i="1" dirty="0" err="1" smtClean="0"/>
+              <a:t>Timer</a:t>
+            </a:r>
+            <a:r>
+              <a:rPr lang="de-CH" dirty="0" smtClean="0"/>
+              <a:t/>
+            </a:r>
+            <a:br>
+              <a:rPr lang="de-CH" dirty="0" smtClean="0"/>
+            </a:br>
+            <a:r>
+              <a:rPr lang="de-CH" dirty="0" smtClean="0"/>
+              <a:t>für Datenverarbeitungs-Threads)</a:t>
+            </a:r>
+            <a:endParaRPr lang="de-CH" dirty="0" smtClean="0"/>
           </a:p>
         </p:txBody>
       </p:sp>
@@ -7845,36 +8015,6 @@
           </a:p>
         </p:txBody>
       </p:sp>
-      <p:pic>
-        <p:nvPicPr>
-          <p:cNvPr id="4" name="Grafik 3"/>
-          <p:cNvPicPr>
-            <a:picLocks noChangeAspect="1"/>
-          </p:cNvPicPr>
-          <p:nvPr/>
-        </p:nvPicPr>
-        <p:blipFill>
-          <a:blip r:embed="rId4">
-            <a:extLst>
-              <a:ext uri="{28A0092B-C50C-407E-A947-70E740481C1C}">
-                <a14:useLocalDpi xmlns:a14="http://schemas.microsoft.com/office/drawing/2010/main" val="0"/>
-              </a:ext>
-            </a:extLst>
-          </a:blip>
-          <a:stretch>
-            <a:fillRect/>
-          </a:stretch>
-        </p:blipFill>
-        <p:spPr>
-          <a:xfrm>
-            <a:off x="2501974" y="2342674"/>
-            <a:ext cx="3839111" cy="3353268"/>
-          </a:xfrm>
-          <a:prstGeom prst="rect">
-            <a:avLst/>
-          </a:prstGeom>
-        </p:spPr>
-      </p:pic>
     </p:spTree>
   </p:cSld>
   <p:clrMapOvr>
@@ -7907,6 +8047,510 @@
           <a:chExt cx="0" cy="0"/>
         </a:xfrm>
       </p:grpSpPr>
+      <p:sp>
+        <p:nvSpPr>
+          <p:cNvPr id="2" name="Inhaltsplatzhalter 1"/>
+          <p:cNvSpPr>
+            <a:spLocks noGrp="1"/>
+          </p:cNvSpPr>
+          <p:nvPr>
+            <p:ph sz="half" idx="1"/>
+          </p:nvPr>
+        </p:nvSpPr>
+        <p:spPr/>
+        <p:txBody>
+          <a:bodyPr/>
+          <a:lstStyle/>
+          <a:p>
+            <a:endParaRPr lang="de-CH" dirty="0"/>
+          </a:p>
+        </p:txBody>
+      </p:sp>
+      <p:sp>
+        <p:nvSpPr>
+          <p:cNvPr id="3" name="Titel 2"/>
+          <p:cNvSpPr>
+            <a:spLocks noGrp="1"/>
+          </p:cNvSpPr>
+          <p:nvPr>
+            <p:ph type="ctrTitle"/>
+          </p:nvPr>
+        </p:nvSpPr>
+        <p:spPr/>
+        <p:txBody>
+          <a:bodyPr/>
+          <a:lstStyle/>
+          <a:p>
+            <a:r>
+              <a:rPr lang="de-CH" dirty="0" smtClean="0"/>
+              <a:t>Datenverarbeitung</a:t>
+            </a:r>
+            <a:endParaRPr lang="de-CH" dirty="0"/>
+          </a:p>
+        </p:txBody>
+      </p:sp>
+      <p:sp>
+        <p:nvSpPr>
+          <p:cNvPr id="4" name="Rechteck 3"/>
+          <p:cNvSpPr/>
+          <p:nvPr/>
+        </p:nvSpPr>
+        <p:spPr>
+          <a:xfrm>
+            <a:off x="337587" y="2069948"/>
+            <a:ext cx="2150962" cy="729205"/>
+          </a:xfrm>
+          <a:prstGeom prst="rect">
+            <a:avLst/>
+          </a:prstGeom>
+        </p:spPr>
+        <p:style>
+          <a:lnRef idx="1">
+            <a:schemeClr val="dk1"/>
+          </a:lnRef>
+          <a:fillRef idx="3">
+            <a:schemeClr val="dk1"/>
+          </a:fillRef>
+          <a:effectRef idx="2">
+            <a:schemeClr val="dk1"/>
+          </a:effectRef>
+          <a:fontRef idx="minor">
+            <a:schemeClr val="lt1"/>
+          </a:fontRef>
+        </p:style>
+        <p:txBody>
+          <a:bodyPr rtlCol="0" anchor="ctr"/>
+          <a:lstStyle/>
+          <a:p>
+            <a:pPr algn="ctr"/>
+            <a:r>
+              <a:rPr lang="de-CH" dirty="0" smtClean="0"/>
+              <a:t>Sensor (auslesen)</a:t>
+            </a:r>
+            <a:endParaRPr lang="de-CH" dirty="0"/>
+          </a:p>
+        </p:txBody>
+      </p:sp>
+      <p:sp>
+        <p:nvSpPr>
+          <p:cNvPr id="5" name="Rechteck 4"/>
+          <p:cNvSpPr/>
+          <p:nvPr/>
+        </p:nvSpPr>
+        <p:spPr>
+          <a:xfrm>
+            <a:off x="337587" y="3574659"/>
+            <a:ext cx="2150962" cy="729205"/>
+          </a:xfrm>
+          <a:prstGeom prst="rect">
+            <a:avLst/>
+          </a:prstGeom>
+        </p:spPr>
+        <p:style>
+          <a:lnRef idx="1">
+            <a:schemeClr val="accent5"/>
+          </a:lnRef>
+          <a:fillRef idx="3">
+            <a:schemeClr val="accent5"/>
+          </a:fillRef>
+          <a:effectRef idx="2">
+            <a:schemeClr val="accent5"/>
+          </a:effectRef>
+          <a:fontRef idx="minor">
+            <a:schemeClr val="lt1"/>
+          </a:fontRef>
+        </p:style>
+        <p:txBody>
+          <a:bodyPr rtlCol="0" anchor="ctr"/>
+          <a:lstStyle/>
+          <a:p>
+            <a:pPr algn="ctr"/>
+            <a:r>
+              <a:rPr lang="de-CH" dirty="0" smtClean="0"/>
+              <a:t>Beschleunig-</a:t>
+            </a:r>
+            <a:r>
+              <a:rPr lang="de-CH" dirty="0" err="1" smtClean="0"/>
+              <a:t>ung</a:t>
+            </a:r>
+            <a:r>
+              <a:rPr lang="de-CH" dirty="0" smtClean="0"/>
+              <a:t> </a:t>
+            </a:r>
+            <a:r>
+              <a:rPr lang="de-CH" i="1" dirty="0" smtClean="0"/>
+              <a:t>a</a:t>
+            </a:r>
+            <a:endParaRPr lang="de-CH" i="1" dirty="0"/>
+          </a:p>
+        </p:txBody>
+      </p:sp>
+      <p:sp>
+        <p:nvSpPr>
+          <p:cNvPr id="6" name="Rechteck 5"/>
+          <p:cNvSpPr/>
+          <p:nvPr/>
+        </p:nvSpPr>
+        <p:spPr>
+          <a:xfrm>
+            <a:off x="3426109" y="3574659"/>
+            <a:ext cx="2345802" cy="729205"/>
+          </a:xfrm>
+          <a:prstGeom prst="rect">
+            <a:avLst/>
+          </a:prstGeom>
+        </p:spPr>
+        <p:style>
+          <a:lnRef idx="1">
+            <a:schemeClr val="accent3"/>
+          </a:lnRef>
+          <a:fillRef idx="3">
+            <a:schemeClr val="accent3"/>
+          </a:fillRef>
+          <a:effectRef idx="2">
+            <a:schemeClr val="accent3"/>
+          </a:effectRef>
+          <a:fontRef idx="minor">
+            <a:schemeClr val="lt1"/>
+          </a:fontRef>
+        </p:style>
+        <p:txBody>
+          <a:bodyPr rtlCol="0" anchor="ctr"/>
+          <a:lstStyle/>
+          <a:p>
+            <a:pPr algn="ctr"/>
+            <a:r>
+              <a:rPr lang="de-CH" dirty="0" err="1" smtClean="0"/>
+              <a:t>Geschwindig-keit</a:t>
+            </a:r>
+            <a:r>
+              <a:rPr lang="de-CH" dirty="0" smtClean="0"/>
+              <a:t> </a:t>
+            </a:r>
+            <a:r>
+              <a:rPr lang="de-CH" i="1" dirty="0" smtClean="0"/>
+              <a:t>v</a:t>
+            </a:r>
+            <a:endParaRPr lang="de-CH" i="1" dirty="0"/>
+          </a:p>
+        </p:txBody>
+      </p:sp>
+      <p:sp>
+        <p:nvSpPr>
+          <p:cNvPr id="7" name="Rechteck 6"/>
+          <p:cNvSpPr/>
+          <p:nvPr/>
+        </p:nvSpPr>
+        <p:spPr>
+          <a:xfrm>
+            <a:off x="6684392" y="3574659"/>
+            <a:ext cx="2150962" cy="729205"/>
+          </a:xfrm>
+          <a:prstGeom prst="rect">
+            <a:avLst/>
+          </a:prstGeom>
+        </p:spPr>
+        <p:style>
+          <a:lnRef idx="1">
+            <a:schemeClr val="accent2"/>
+          </a:lnRef>
+          <a:fillRef idx="3">
+            <a:schemeClr val="accent2"/>
+          </a:fillRef>
+          <a:effectRef idx="2">
+            <a:schemeClr val="accent2"/>
+          </a:effectRef>
+          <a:fontRef idx="minor">
+            <a:schemeClr val="lt1"/>
+          </a:fontRef>
+        </p:style>
+        <p:txBody>
+          <a:bodyPr rtlCol="0" anchor="ctr"/>
+          <a:lstStyle/>
+          <a:p>
+            <a:pPr algn="ctr"/>
+            <a:r>
+              <a:rPr lang="de-CH" dirty="0" smtClean="0"/>
+              <a:t>Strecke </a:t>
+            </a:r>
+            <a:r>
+              <a:rPr lang="de-CH" i="1" dirty="0" smtClean="0"/>
+              <a:t>x, y</a:t>
+            </a:r>
+            <a:endParaRPr lang="de-CH" i="1" dirty="0"/>
+          </a:p>
+        </p:txBody>
+      </p:sp>
+      <p:sp>
+        <p:nvSpPr>
+          <p:cNvPr id="8" name="Rechteck 7"/>
+          <p:cNvSpPr/>
+          <p:nvPr/>
+        </p:nvSpPr>
+        <p:spPr>
+          <a:xfrm>
+            <a:off x="6684392" y="5031969"/>
+            <a:ext cx="2150962" cy="729205"/>
+          </a:xfrm>
+          <a:prstGeom prst="rect">
+            <a:avLst/>
+          </a:prstGeom>
+        </p:spPr>
+        <p:style>
+          <a:lnRef idx="1">
+            <a:schemeClr val="dk1"/>
+          </a:lnRef>
+          <a:fillRef idx="3">
+            <a:schemeClr val="dk1"/>
+          </a:fillRef>
+          <a:effectRef idx="2">
+            <a:schemeClr val="dk1"/>
+          </a:effectRef>
+          <a:fontRef idx="minor">
+            <a:schemeClr val="lt1"/>
+          </a:fontRef>
+        </p:style>
+        <p:txBody>
+          <a:bodyPr rtlCol="0" anchor="ctr"/>
+          <a:lstStyle/>
+          <a:p>
+            <a:pPr algn="ctr"/>
+            <a:r>
+              <a:rPr lang="de-CH" dirty="0" smtClean="0"/>
+              <a:t>Ballposition (zeichnen)</a:t>
+            </a:r>
+            <a:endParaRPr lang="de-CH" i="1" dirty="0"/>
+          </a:p>
+        </p:txBody>
+      </p:sp>
+      <p:cxnSp>
+        <p:nvCxnSpPr>
+          <p:cNvPr id="10" name="Gerade Verbindung mit Pfeil 9"/>
+          <p:cNvCxnSpPr>
+            <a:stCxn id="4" idx="2"/>
+            <a:endCxn id="5" idx="0"/>
+          </p:cNvCxnSpPr>
+          <p:nvPr/>
+        </p:nvCxnSpPr>
+        <p:spPr>
+          <a:xfrm>
+            <a:off x="1413068" y="2799153"/>
+            <a:ext cx="0" cy="775506"/>
+          </a:xfrm>
+          <a:prstGeom prst="straightConnector1">
+            <a:avLst/>
+          </a:prstGeom>
+          <a:ln>
+            <a:tailEnd type="arrow"/>
+          </a:ln>
+        </p:spPr>
+        <p:style>
+          <a:lnRef idx="2">
+            <a:schemeClr val="accent1"/>
+          </a:lnRef>
+          <a:fillRef idx="0">
+            <a:schemeClr val="accent1"/>
+          </a:fillRef>
+          <a:effectRef idx="1">
+            <a:schemeClr val="accent1"/>
+          </a:effectRef>
+          <a:fontRef idx="minor">
+            <a:schemeClr val="tx1"/>
+          </a:fontRef>
+        </p:style>
+      </p:cxnSp>
+      <p:cxnSp>
+        <p:nvCxnSpPr>
+          <p:cNvPr id="12" name="Gerade Verbindung mit Pfeil 11"/>
+          <p:cNvCxnSpPr>
+            <a:stCxn id="5" idx="3"/>
+            <a:endCxn id="6" idx="1"/>
+          </p:cNvCxnSpPr>
+          <p:nvPr/>
+        </p:nvCxnSpPr>
+        <p:spPr>
+          <a:xfrm>
+            <a:off x="2488549" y="3939262"/>
+            <a:ext cx="937560" cy="0"/>
+          </a:xfrm>
+          <a:prstGeom prst="straightConnector1">
+            <a:avLst/>
+          </a:prstGeom>
+          <a:ln>
+            <a:tailEnd type="arrow"/>
+          </a:ln>
+        </p:spPr>
+        <p:style>
+          <a:lnRef idx="2">
+            <a:schemeClr val="accent1"/>
+          </a:lnRef>
+          <a:fillRef idx="0">
+            <a:schemeClr val="accent1"/>
+          </a:fillRef>
+          <a:effectRef idx="1">
+            <a:schemeClr val="accent1"/>
+          </a:effectRef>
+          <a:fontRef idx="minor">
+            <a:schemeClr val="tx1"/>
+          </a:fontRef>
+        </p:style>
+      </p:cxnSp>
+      <p:cxnSp>
+        <p:nvCxnSpPr>
+          <p:cNvPr id="14" name="Gerade Verbindung mit Pfeil 13"/>
+          <p:cNvCxnSpPr>
+            <a:stCxn id="6" idx="3"/>
+            <a:endCxn id="7" idx="1"/>
+          </p:cNvCxnSpPr>
+          <p:nvPr/>
+        </p:nvCxnSpPr>
+        <p:spPr>
+          <a:xfrm>
+            <a:off x="5771911" y="3939262"/>
+            <a:ext cx="912481" cy="0"/>
+          </a:xfrm>
+          <a:prstGeom prst="straightConnector1">
+            <a:avLst/>
+          </a:prstGeom>
+          <a:ln>
+            <a:tailEnd type="arrow"/>
+          </a:ln>
+        </p:spPr>
+        <p:style>
+          <a:lnRef idx="2">
+            <a:schemeClr val="accent1"/>
+          </a:lnRef>
+          <a:fillRef idx="0">
+            <a:schemeClr val="accent1"/>
+          </a:fillRef>
+          <a:effectRef idx="1">
+            <a:schemeClr val="accent1"/>
+          </a:effectRef>
+          <a:fontRef idx="minor">
+            <a:schemeClr val="tx1"/>
+          </a:fontRef>
+        </p:style>
+      </p:cxnSp>
+      <p:cxnSp>
+        <p:nvCxnSpPr>
+          <p:cNvPr id="16" name="Gerade Verbindung mit Pfeil 15"/>
+          <p:cNvCxnSpPr>
+            <a:stCxn id="7" idx="2"/>
+            <a:endCxn id="8" idx="0"/>
+          </p:cNvCxnSpPr>
+          <p:nvPr/>
+        </p:nvCxnSpPr>
+        <p:spPr>
+          <a:xfrm>
+            <a:off x="7759873" y="4303864"/>
+            <a:ext cx="0" cy="728105"/>
+          </a:xfrm>
+          <a:prstGeom prst="straightConnector1">
+            <a:avLst/>
+          </a:prstGeom>
+          <a:ln>
+            <a:tailEnd type="arrow"/>
+          </a:ln>
+        </p:spPr>
+        <p:style>
+          <a:lnRef idx="2">
+            <a:schemeClr val="accent1"/>
+          </a:lnRef>
+          <a:fillRef idx="0">
+            <a:schemeClr val="accent1"/>
+          </a:fillRef>
+          <a:effectRef idx="1">
+            <a:schemeClr val="accent1"/>
+          </a:effectRef>
+          <a:fontRef idx="minor">
+            <a:schemeClr val="tx1"/>
+          </a:fontRef>
+        </p:style>
+      </p:cxnSp>
+      <p:pic>
+        <p:nvPicPr>
+          <p:cNvPr id="2050" name="Picture 2" descr="http://community.boredofstudies.org/attachments/238/extracurricular-topics/26001d1343909253-favourite-mathematical-symbol-220px-wpint.svg.png"/>
+          <p:cNvPicPr>
+            <a:picLocks noChangeAspect="1" noChangeArrowheads="1"/>
+          </p:cNvPicPr>
+          <p:nvPr/>
+        </p:nvPicPr>
+        <p:blipFill>
+          <a:blip r:embed="rId2"/>
+          <a:srcRect/>
+          <a:stretch>
+            <a:fillRect/>
+          </a:stretch>
+        </p:blipFill>
+        <p:spPr bwMode="auto">
+          <a:xfrm>
+            <a:off x="2754333" y="3230720"/>
+            <a:ext cx="428705" cy="687877"/>
+          </a:xfrm>
+          <a:prstGeom prst="rect">
+            <a:avLst/>
+          </a:prstGeom>
+          <a:noFill/>
+        </p:spPr>
+      </p:pic>
+      <p:pic>
+        <p:nvPicPr>
+          <p:cNvPr id="18" name="Picture 2" descr="http://community.boredofstudies.org/attachments/238/extracurricular-topics/26001d1343909253-favourite-mathematical-symbol-220px-wpint.svg.png"/>
+          <p:cNvPicPr>
+            <a:picLocks noChangeAspect="1" noChangeArrowheads="1"/>
+          </p:cNvPicPr>
+          <p:nvPr/>
+        </p:nvPicPr>
+        <p:blipFill>
+          <a:blip r:embed="rId2"/>
+          <a:srcRect/>
+          <a:stretch>
+            <a:fillRect/>
+          </a:stretch>
+        </p:blipFill>
+        <p:spPr bwMode="auto">
+          <a:xfrm>
+            <a:off x="6031898" y="3230720"/>
+            <a:ext cx="428705" cy="687877"/>
+          </a:xfrm>
+          <a:prstGeom prst="rect">
+            <a:avLst/>
+          </a:prstGeom>
+          <a:noFill/>
+        </p:spPr>
+      </p:pic>
+    </p:spTree>
+  </p:cSld>
+  <p:clrMapOvr>
+    <a:masterClrMapping/>
+  </p:clrMapOvr>
+  <p:timing>
+    <p:tnLst>
+      <p:par>
+        <p:cTn id="1" dur="indefinite" restart="never" nodeType="tmRoot"/>
+      </p:par>
+    </p:tnLst>
+  </p:timing>
+</p:sld>
+</file>
+
+<file path=ppt/slides/slide5.xml><?xml version="1.0" encoding="utf-8"?>
+<p:sld xmlns:a="http://schemas.openxmlformats.org/drawingml/2006/main" xmlns:r="http://schemas.openxmlformats.org/officeDocument/2006/relationships" xmlns:p="http://schemas.openxmlformats.org/presentationml/2006/main">
+  <p:cSld>
+    <p:spTree>
+      <p:nvGrpSpPr>
+        <p:cNvPr id="1" name=""/>
+        <p:cNvGrpSpPr/>
+        <p:nvPr/>
+      </p:nvGrpSpPr>
+      <p:grpSpPr>
+        <a:xfrm>
+          <a:off x="0" y="0"/>
+          <a:ext cx="0" cy="0"/>
+          <a:chOff x="0" y="0"/>
+          <a:chExt cx="0" cy="0"/>
+        </a:xfrm>
+      </p:grpSpPr>
       <p:pic>
         <p:nvPicPr>
           <p:cNvPr id="12" name="Grafik 11"/>
@@ -7919,7 +8563,7 @@
           <a:blip r:embed="rId3">
             <a:extLst>
               <a:ext uri="{28A0092B-C50C-407E-A947-70E740481C1C}">
-                <a14:useLocalDpi xmlns:a14="http://schemas.microsoft.com/office/drawing/2010/main" val="0"/>
+                <a14:useLocalDpi xmlns:a14="http://schemas.microsoft.com/office/drawing/2010/main" xmlns="" val="0"/>
               </a:ext>
             </a:extLst>
           </a:blip>
@@ -8125,9 +8769,19 @@
             <a:pPr algn="ctr"/>
             <a:r>
               <a:rPr lang="de-CH" sz="1600" dirty="0" smtClean="0"/>
-              <a:t>Trägheit 1…4</a:t>
-            </a:r>
-            <a:endParaRPr lang="de-CH" dirty="0" smtClean="0"/>
+              <a:t>Trägheit </a:t>
+            </a:r>
+            <a:r>
+              <a:rPr lang="de-CH" sz="1600" dirty="0" smtClean="0"/>
+              <a:t>1…4,</a:t>
+            </a:r>
+          </a:p>
+          <a:p>
+            <a:pPr algn="ctr"/>
+            <a:r>
+              <a:rPr lang="de-CH" sz="1600" dirty="0" smtClean="0"/>
+              <a:t>Kalibrierung (1+2+3+4)</a:t>
+            </a:r>
           </a:p>
         </p:txBody>
       </p:sp>
@@ -8377,7 +9031,7 @@
     </p:spTree>
     <p:extLst>
       <p:ext uri="{BB962C8B-B14F-4D97-AF65-F5344CB8AC3E}">
-        <p14:creationId xmlns:p14="http://schemas.microsoft.com/office/powerpoint/2010/main" val="546106501"/>
+        <p14:creationId xmlns:p14="http://schemas.microsoft.com/office/powerpoint/2010/main" xmlns="" val="546106501"/>
       </p:ext>
     </p:extLst>
   </p:cSld>
@@ -8394,7 +9048,7 @@
 </p:sld>
 </file>
 
-<file path=ppt/slides/slide5.xml><?xml version="1.0" encoding="utf-8"?>
+<file path=ppt/slides/slide6.xml><?xml version="1.0" encoding="utf-8"?>
 <p:sld xmlns:a="http://schemas.openxmlformats.org/drawingml/2006/main" xmlns:r="http://schemas.openxmlformats.org/officeDocument/2006/relationships" xmlns:p="http://schemas.openxmlformats.org/presentationml/2006/main">
   <p:cSld>
     <p:spTree>
@@ -9342,6 +9996,25 @@
 </file>
 
 <file path=customXml/item1.xml><?xml version="1.0" encoding="utf-8"?>
+<p:properties xmlns:p="http://schemas.microsoft.com/office/2006/metadata/properties" xmlns:xsi="http://www.w3.org/2001/XMLSchema-instance">
+  <documentManagement>
+    <Betriebsystem xmlns="238ac175-5152-443e-bf42-417a27926292">Windows/Mac</Betriebsystem>
+    <Office_x002d_Version xmlns="238ac175-5152-443e-bf42-417a27926292">Office 2010/2011</Office_x002d_Version>
+    <Kategorie xmlns="238ac175-5152-443e-bf42-417a27926292">Powerpoint</Kategorie>
+  </documentManagement>
+</p:properties>
+</file>
+
+<file path=customXml/item2.xml><?xml version="1.0" encoding="utf-8"?>
+<?mso-contentType ?>
+<FormTemplates xmlns="http://schemas.microsoft.com/sharepoint/v3/contenttype/forms">
+  <Display>DocumentLibraryForm</Display>
+  <Edit>DocumentLibraryForm</Edit>
+  <New>DocumentLibraryForm</New>
+</FormTemplates>
+</file>
+
+<file path=customXml/item3.xml><?xml version="1.0" encoding="utf-8"?>
 <ct:contentTypeSchema xmlns:ct="http://schemas.microsoft.com/office/2006/metadata/contentType" xmlns:ma="http://schemas.microsoft.com/office/2006/metadata/properties/metaAttributes" ct:_="" ma:_="" ma:contentTypeName="Dokument" ma:contentTypeID="0x0101003A4279409C3118409D418E682AEFAFB0" ma:contentTypeVersion="3" ma:contentTypeDescription="Ein neues Dokument erstellen." ma:contentTypeScope="" ma:versionID="e92c536c6edd1ac40de16e8e39ad252d">
   <xsd:schema xmlns:xsd="http://www.w3.org/2001/XMLSchema" xmlns:p="http://schemas.microsoft.com/office/2006/metadata/properties" xmlns:ns2="238ac175-5152-443e-bf42-417a27926292" targetNamespace="http://schemas.microsoft.com/office/2006/metadata/properties" ma:root="true" ma:fieldsID="71298498c6d76ba8a930c8130d4fb10e" ns2:_="">
     <xsd:import namespace="238ac175-5152-443e-bf42-417a27926292"/>
@@ -9425,26 +10098,30 @@
 </ct:contentTypeSchema>
 </file>
 
-<file path=customXml/item2.xml><?xml version="1.0" encoding="utf-8"?>
-<?mso-contentType ?>
-<FormTemplates xmlns="http://schemas.microsoft.com/sharepoint/v3/contenttype/forms">
-  <Display>DocumentLibraryForm</Display>
-  <Edit>DocumentLibraryForm</Edit>
-  <New>DocumentLibraryForm</New>
-</FormTemplates>
+<file path=customXml/itemProps1.xml><?xml version="1.0" encoding="utf-8"?>
+<ds:datastoreItem xmlns:ds="http://schemas.openxmlformats.org/officeDocument/2006/customXml" ds:itemID="{F1B07C9B-62EC-4346-AB37-FD9874CBA0EB}">
+  <ds:schemaRefs>
+    <ds:schemaRef ds:uri="http://purl.org/dc/elements/1.1/"/>
+    <ds:schemaRef ds:uri="http://schemas.microsoft.com/office/2006/metadata/properties"/>
+    <ds:schemaRef ds:uri="http://purl.org/dc/terms/"/>
+    <ds:schemaRef ds:uri="238ac175-5152-443e-bf42-417a27926292"/>
+    <ds:schemaRef ds:uri="http://schemas.microsoft.com/office/2006/documentManagement/types"/>
+    <ds:schemaRef ds:uri="http://schemas.openxmlformats.org/package/2006/metadata/core-properties"/>
+    <ds:schemaRef ds:uri="http://www.w3.org/XML/1998/namespace"/>
+    <ds:schemaRef ds:uri="http://purl.org/dc/dcmitype/"/>
+  </ds:schemaRefs>
+</ds:datastoreItem>
 </file>
 
-<file path=customXml/item3.xml><?xml version="1.0" encoding="utf-8"?>
-<p:properties xmlns:p="http://schemas.microsoft.com/office/2006/metadata/properties" xmlns:xsi="http://www.w3.org/2001/XMLSchema-instance">
-  <documentManagement>
-    <Betriebsystem xmlns="238ac175-5152-443e-bf42-417a27926292">Windows/Mac</Betriebsystem>
-    <Office_x002d_Version xmlns="238ac175-5152-443e-bf42-417a27926292">Office 2010/2011</Office_x002d_Version>
-    <Kategorie xmlns="238ac175-5152-443e-bf42-417a27926292">Powerpoint</Kategorie>
-  </documentManagement>
-</p:properties>
+<file path=customXml/itemProps2.xml><?xml version="1.0" encoding="utf-8"?>
+<ds:datastoreItem xmlns:ds="http://schemas.openxmlformats.org/officeDocument/2006/customXml" ds:itemID="{FCD14AB6-6E58-442F-B70D-2B317664A115}">
+  <ds:schemaRefs>
+    <ds:schemaRef ds:uri="http://schemas.microsoft.com/sharepoint/v3/contenttype/forms"/>
+  </ds:schemaRefs>
+</ds:datastoreItem>
 </file>
 
-<file path=customXml/itemProps1.xml><?xml version="1.0" encoding="utf-8"?>
+<file path=customXml/itemProps3.xml><?xml version="1.0" encoding="utf-8"?>
 <ds:datastoreItem xmlns:ds="http://schemas.openxmlformats.org/officeDocument/2006/customXml" ds:itemID="{686135C8-3D06-426A-9BDC-22E94881FDD6}">
   <ds:schemaRefs>
     <ds:schemaRef ds:uri="http://schemas.microsoft.com/office/2006/metadata/contentType"/>
@@ -9459,27 +10136,4 @@
     <ds:schemaRef ds:uri="http://schemas.microsoft.com/office/internal/2005/internalDocumentation"/>
   </ds:schemaRefs>
 </ds:datastoreItem>
-</file>
-
-<file path=customXml/itemProps2.xml><?xml version="1.0" encoding="utf-8"?>
-<ds:datastoreItem xmlns:ds="http://schemas.openxmlformats.org/officeDocument/2006/customXml" ds:itemID="{FCD14AB6-6E58-442F-B70D-2B317664A115}">
-  <ds:schemaRefs>
-    <ds:schemaRef ds:uri="http://schemas.microsoft.com/sharepoint/v3/contenttype/forms"/>
-  </ds:schemaRefs>
-</ds:datastoreItem>
-</file>
-
-<file path=customXml/itemProps3.xml><?xml version="1.0" encoding="utf-8"?>
-<ds:datastoreItem xmlns:ds="http://schemas.openxmlformats.org/officeDocument/2006/customXml" ds:itemID="{F1B07C9B-62EC-4346-AB37-FD9874CBA0EB}">
-  <ds:schemaRefs>
-    <ds:schemaRef ds:uri="http://purl.org/dc/elements/1.1/"/>
-    <ds:schemaRef ds:uri="http://schemas.microsoft.com/office/2006/metadata/properties"/>
-    <ds:schemaRef ds:uri="http://purl.org/dc/terms/"/>
-    <ds:schemaRef ds:uri="238ac175-5152-443e-bf42-417a27926292"/>
-    <ds:schemaRef ds:uri="http://schemas.microsoft.com/office/2006/documentManagement/types"/>
-    <ds:schemaRef ds:uri="http://schemas.openxmlformats.org/package/2006/metadata/core-properties"/>
-    <ds:schemaRef ds:uri="http://www.w3.org/XML/1998/namespace"/>
-    <ds:schemaRef ds:uri="http://purl.org/dc/dcmitype/"/>
-  </ds:schemaRefs>
-</ds:datastoreItem>
 </file>
</xml_diff>